<commit_message>
update to map02.html and npcHistory.html
</commit_message>
<xml_diff>
--- a/Illustrations/Kira Coldspring.pptx
+++ b/Illustrations/Kira Coldspring.pptx
@@ -6,6 +6,8 @@
   </p:sldMasterIdLst>
   <p:sldIdLst>
     <p:sldId id="256" r:id="rId2"/>
+    <p:sldId id="257" r:id="rId3"/>
+    <p:sldId id="258" r:id="rId4"/>
   </p:sldIdLst>
   <p:sldSz cx="12192000" cy="6858000"/>
   <p:notesSz cx="6858000" cy="9144000"/>
@@ -104,6 +106,11 @@
       </a:defRPr>
     </a:lvl9pPr>
   </p:defaultTextStyle>
+  <p:extLst>
+    <p:ext uri="{EFAFB233-063F-42B5-8137-9DF3F51BA10A}">
+      <p15:sldGuideLst xmlns:p15="http://schemas.microsoft.com/office/powerpoint/2012/main"/>
+    </p:ext>
+  </p:extLst>
 </p:presentation>
 </file>
 
@@ -254,7 +261,7 @@
           <a:p>
             <a:fld id="{9A5C6AA2-EAFC-45C4-A237-23B74ACE9C79}" type="datetimeFigureOut">
               <a:rPr lang="en-US" smtClean="0"/>
-              <a:t>3/7/2025</a:t>
+              <a:t>6/22/2025</a:t>
             </a:fld>
             <a:endParaRPr lang="en-US"/>
           </a:p>
@@ -452,7 +459,7 @@
           <a:p>
             <a:fld id="{9A5C6AA2-EAFC-45C4-A237-23B74ACE9C79}" type="datetimeFigureOut">
               <a:rPr lang="en-US" smtClean="0"/>
-              <a:t>3/7/2025</a:t>
+              <a:t>6/22/2025</a:t>
             </a:fld>
             <a:endParaRPr lang="en-US"/>
           </a:p>
@@ -660,7 +667,7 @@
           <a:p>
             <a:fld id="{9A5C6AA2-EAFC-45C4-A237-23B74ACE9C79}" type="datetimeFigureOut">
               <a:rPr lang="en-US" smtClean="0"/>
-              <a:t>3/7/2025</a:t>
+              <a:t>6/22/2025</a:t>
             </a:fld>
             <a:endParaRPr lang="en-US"/>
           </a:p>
@@ -858,7 +865,7 @@
           <a:p>
             <a:fld id="{9A5C6AA2-EAFC-45C4-A237-23B74ACE9C79}" type="datetimeFigureOut">
               <a:rPr lang="en-US" smtClean="0"/>
-              <a:t>3/7/2025</a:t>
+              <a:t>6/22/2025</a:t>
             </a:fld>
             <a:endParaRPr lang="en-US"/>
           </a:p>
@@ -1133,7 +1140,7 @@
           <a:p>
             <a:fld id="{9A5C6AA2-EAFC-45C4-A237-23B74ACE9C79}" type="datetimeFigureOut">
               <a:rPr lang="en-US" smtClean="0"/>
-              <a:t>3/7/2025</a:t>
+              <a:t>6/22/2025</a:t>
             </a:fld>
             <a:endParaRPr lang="en-US"/>
           </a:p>
@@ -1398,7 +1405,7 @@
           <a:p>
             <a:fld id="{9A5C6AA2-EAFC-45C4-A237-23B74ACE9C79}" type="datetimeFigureOut">
               <a:rPr lang="en-US" smtClean="0"/>
-              <a:t>3/7/2025</a:t>
+              <a:t>6/22/2025</a:t>
             </a:fld>
             <a:endParaRPr lang="en-US"/>
           </a:p>
@@ -1810,7 +1817,7 @@
           <a:p>
             <a:fld id="{9A5C6AA2-EAFC-45C4-A237-23B74ACE9C79}" type="datetimeFigureOut">
               <a:rPr lang="en-US" smtClean="0"/>
-              <a:t>3/7/2025</a:t>
+              <a:t>6/22/2025</a:t>
             </a:fld>
             <a:endParaRPr lang="en-US"/>
           </a:p>
@@ -1951,7 +1958,7 @@
           <a:p>
             <a:fld id="{9A5C6AA2-EAFC-45C4-A237-23B74ACE9C79}" type="datetimeFigureOut">
               <a:rPr lang="en-US" smtClean="0"/>
-              <a:t>3/7/2025</a:t>
+              <a:t>6/22/2025</a:t>
             </a:fld>
             <a:endParaRPr lang="en-US"/>
           </a:p>
@@ -2064,7 +2071,7 @@
           <a:p>
             <a:fld id="{9A5C6AA2-EAFC-45C4-A237-23B74ACE9C79}" type="datetimeFigureOut">
               <a:rPr lang="en-US" smtClean="0"/>
-              <a:t>3/7/2025</a:t>
+              <a:t>6/22/2025</a:t>
             </a:fld>
             <a:endParaRPr lang="en-US"/>
           </a:p>
@@ -2375,7 +2382,7 @@
           <a:p>
             <a:fld id="{9A5C6AA2-EAFC-45C4-A237-23B74ACE9C79}" type="datetimeFigureOut">
               <a:rPr lang="en-US" smtClean="0"/>
-              <a:t>3/7/2025</a:t>
+              <a:t>6/22/2025</a:t>
             </a:fld>
             <a:endParaRPr lang="en-US"/>
           </a:p>
@@ -2663,7 +2670,7 @@
           <a:p>
             <a:fld id="{9A5C6AA2-EAFC-45C4-A237-23B74ACE9C79}" type="datetimeFigureOut">
               <a:rPr lang="en-US" smtClean="0"/>
-              <a:t>3/7/2025</a:t>
+              <a:t>6/22/2025</a:t>
             </a:fld>
             <a:endParaRPr lang="en-US"/>
           </a:p>
@@ -2904,7 +2911,7 @@
           <a:p>
             <a:fld id="{9A5C6AA2-EAFC-45C4-A237-23B74ACE9C79}" type="datetimeFigureOut">
               <a:rPr lang="en-US" smtClean="0"/>
-              <a:t>3/7/2025</a:t>
+              <a:t>6/22/2025</a:t>
             </a:fld>
             <a:endParaRPr lang="en-US"/>
           </a:p>
@@ -3582,6 +3589,268 @@
     <p:extLst>
       <p:ext uri="{BB962C8B-B14F-4D97-AF65-F5344CB8AC3E}">
         <p14:creationId xmlns:p14="http://schemas.microsoft.com/office/powerpoint/2010/main" val="1099056925"/>
+      </p:ext>
+    </p:extLst>
+  </p:cSld>
+  <p:clrMapOvr>
+    <a:masterClrMapping/>
+  </p:clrMapOvr>
+</p:sld>
+</file>
+
+<file path=ppt/slides/slide2.xml><?xml version="1.0" encoding="utf-8"?>
+<p:sld xmlns:a="http://schemas.openxmlformats.org/drawingml/2006/main" xmlns:r="http://schemas.openxmlformats.org/officeDocument/2006/relationships" xmlns:p="http://schemas.openxmlformats.org/presentationml/2006/main">
+  <p:cSld>
+    <p:spTree>
+      <p:nvGrpSpPr>
+        <p:cNvPr id="1" name=""/>
+        <p:cNvGrpSpPr/>
+        <p:nvPr/>
+      </p:nvGrpSpPr>
+      <p:grpSpPr>
+        <a:xfrm>
+          <a:off x="0" y="0"/>
+          <a:ext cx="0" cy="0"/>
+          <a:chOff x="0" y="0"/>
+          <a:chExt cx="0" cy="0"/>
+        </a:xfrm>
+      </p:grpSpPr>
+      <p:sp>
+        <p:nvSpPr>
+          <p:cNvPr id="4" name="Rectangle 3">
+            <a:extLst>
+              <a:ext uri="{FF2B5EF4-FFF2-40B4-BE49-F238E27FC236}">
+                <a16:creationId xmlns:a16="http://schemas.microsoft.com/office/drawing/2014/main" id="{CC3BD016-4E86-1049-7C77-14D6483D77D2}"/>
+              </a:ext>
+            </a:extLst>
+          </p:cNvPr>
+          <p:cNvSpPr/>
+          <p:nvPr/>
+        </p:nvSpPr>
+        <p:spPr>
+          <a:xfrm>
+            <a:off x="825910" y="1366684"/>
+            <a:ext cx="7385637" cy="2062316"/>
+          </a:xfrm>
+          <a:prstGeom prst="rect">
+            <a:avLst/>
+          </a:prstGeom>
+          <a:noFill/>
+        </p:spPr>
+        <p:txBody>
+          <a:bodyPr wrap="none" lIns="91440" tIns="45720" rIns="91440" bIns="45720">
+            <a:prstTxWarp prst="textArchUp">
+              <a:avLst/>
+            </a:prstTxWarp>
+            <a:spAutoFit/>
+          </a:bodyPr>
+          <a:lstStyle/>
+          <a:p>
+            <a:pPr algn="ctr"/>
+            <a:r>
+              <a:rPr lang="en-US" sz="5400" dirty="0">
+                <a:ln w="0"/>
+                <a:effectLst>
+                  <a:outerShdw blurRad="38100" dist="19050" dir="2700000" algn="tl" rotWithShape="0">
+                    <a:schemeClr val="dk1">
+                      <a:alpha val="40000"/>
+                    </a:schemeClr>
+                  </a:outerShdw>
+                </a:effectLst>
+                <a:latin typeface="Viner Hand ITC" panose="03070502030502020203" pitchFamily="66" charset="0"/>
+              </a:rPr>
+              <a:t>Belladonna Township</a:t>
+            </a:r>
+          </a:p>
+        </p:txBody>
+      </p:sp>
+      <p:sp>
+        <p:nvSpPr>
+          <p:cNvPr id="5" name="Rectangle 4">
+            <a:extLst>
+              <a:ext uri="{FF2B5EF4-FFF2-40B4-BE49-F238E27FC236}">
+                <a16:creationId xmlns:a16="http://schemas.microsoft.com/office/drawing/2014/main" id="{FB9EBAA2-6C75-11F8-B644-DC0549215DBA}"/>
+              </a:ext>
+            </a:extLst>
+          </p:cNvPr>
+          <p:cNvSpPr/>
+          <p:nvPr/>
+        </p:nvSpPr>
+        <p:spPr>
+          <a:xfrm>
+            <a:off x="3007135" y="4460158"/>
+            <a:ext cx="7385637" cy="2062316"/>
+          </a:xfrm>
+          <a:prstGeom prst="rect">
+            <a:avLst/>
+          </a:prstGeom>
+          <a:noFill/>
+        </p:spPr>
+        <p:txBody>
+          <a:bodyPr wrap="none" lIns="91440" tIns="45720" rIns="91440" bIns="45720">
+            <a:prstTxWarp prst="textArchUp">
+              <a:avLst/>
+            </a:prstTxWarp>
+            <a:spAutoFit/>
+          </a:bodyPr>
+          <a:lstStyle/>
+          <a:p>
+            <a:pPr algn="ctr"/>
+            <a:r>
+              <a:rPr lang="en-US" sz="5400" dirty="0">
+                <a:ln w="0"/>
+                <a:effectLst>
+                  <a:outerShdw blurRad="38100" dist="19050" dir="2700000" algn="tl" rotWithShape="0">
+                    <a:schemeClr val="dk1">
+                      <a:alpha val="40000"/>
+                    </a:schemeClr>
+                  </a:outerShdw>
+                </a:effectLst>
+                <a:latin typeface="Viner Hand ITC" panose="03070502030502020203" pitchFamily="66" charset="0"/>
+              </a:rPr>
+              <a:t>Hemlock Caverns</a:t>
+            </a:r>
+          </a:p>
+        </p:txBody>
+      </p:sp>
+    </p:spTree>
+    <p:extLst>
+      <p:ext uri="{BB962C8B-B14F-4D97-AF65-F5344CB8AC3E}">
+        <p14:creationId xmlns:p14="http://schemas.microsoft.com/office/powerpoint/2010/main" val="1034703360"/>
+      </p:ext>
+    </p:extLst>
+  </p:cSld>
+  <p:clrMapOvr>
+    <a:masterClrMapping/>
+  </p:clrMapOvr>
+</p:sld>
+</file>
+
+<file path=ppt/slides/slide3.xml><?xml version="1.0" encoding="utf-8"?>
+<p:sld xmlns:a="http://schemas.openxmlformats.org/drawingml/2006/main" xmlns:r="http://schemas.openxmlformats.org/officeDocument/2006/relationships" xmlns:p="http://schemas.openxmlformats.org/presentationml/2006/main">
+  <p:cSld>
+    <p:spTree>
+      <p:nvGrpSpPr>
+        <p:cNvPr id="1" name="">
+          <a:extLst>
+            <a:ext uri="{FF2B5EF4-FFF2-40B4-BE49-F238E27FC236}">
+              <a16:creationId xmlns:a16="http://schemas.microsoft.com/office/drawing/2014/main" id="{872B315A-8284-848D-4A7A-B1CE35BCFEF2}"/>
+            </a:ext>
+          </a:extLst>
+        </p:cNvPr>
+        <p:cNvGrpSpPr/>
+        <p:nvPr/>
+      </p:nvGrpSpPr>
+      <p:grpSpPr>
+        <a:xfrm>
+          <a:off x="0" y="0"/>
+          <a:ext cx="0" cy="0"/>
+          <a:chOff x="0" y="0"/>
+          <a:chExt cx="0" cy="0"/>
+        </a:xfrm>
+      </p:grpSpPr>
+      <p:sp>
+        <p:nvSpPr>
+          <p:cNvPr id="4" name="Rectangle 3">
+            <a:extLst>
+              <a:ext uri="{FF2B5EF4-FFF2-40B4-BE49-F238E27FC236}">
+                <a16:creationId xmlns:a16="http://schemas.microsoft.com/office/drawing/2014/main" id="{D380764E-3CBC-9571-498E-68196EC3331C}"/>
+              </a:ext>
+            </a:extLst>
+          </p:cNvPr>
+          <p:cNvSpPr/>
+          <p:nvPr/>
+        </p:nvSpPr>
+        <p:spPr>
+          <a:xfrm>
+            <a:off x="825910" y="1366684"/>
+            <a:ext cx="7385637" cy="2062316"/>
+          </a:xfrm>
+          <a:prstGeom prst="rect">
+            <a:avLst/>
+          </a:prstGeom>
+          <a:noFill/>
+        </p:spPr>
+        <p:txBody>
+          <a:bodyPr wrap="none" lIns="91440" tIns="45720" rIns="91440" bIns="45720">
+            <a:prstTxWarp prst="textArchUp">
+              <a:avLst/>
+            </a:prstTxWarp>
+            <a:spAutoFit/>
+          </a:bodyPr>
+          <a:lstStyle/>
+          <a:p>
+            <a:pPr algn="ctr"/>
+            <a:r>
+              <a:rPr lang="en-US" sz="5400" dirty="0">
+                <a:ln w="0"/>
+                <a:effectLst>
+                  <a:outerShdw blurRad="38100" dist="19050" dir="2700000" algn="tl" rotWithShape="0">
+                    <a:schemeClr val="dk1">
+                      <a:alpha val="40000"/>
+                    </a:schemeClr>
+                  </a:outerShdw>
+                </a:effectLst>
+                <a:latin typeface="Viner Hand ITC" panose="03070502030502020203" pitchFamily="66" charset="0"/>
+              </a:rPr>
+              <a:t>Characters and History</a:t>
+            </a:r>
+          </a:p>
+        </p:txBody>
+      </p:sp>
+      <p:sp>
+        <p:nvSpPr>
+          <p:cNvPr id="5" name="Rectangle 4">
+            <a:extLst>
+              <a:ext uri="{FF2B5EF4-FFF2-40B4-BE49-F238E27FC236}">
+                <a16:creationId xmlns:a16="http://schemas.microsoft.com/office/drawing/2014/main" id="{3878DE52-1071-1F4D-2638-6D0D668CC78F}"/>
+              </a:ext>
+            </a:extLst>
+          </p:cNvPr>
+          <p:cNvSpPr/>
+          <p:nvPr/>
+        </p:nvSpPr>
+        <p:spPr>
+          <a:xfrm>
+            <a:off x="3007135" y="4460158"/>
+            <a:ext cx="7385637" cy="2062316"/>
+          </a:xfrm>
+          <a:prstGeom prst="rect">
+            <a:avLst/>
+          </a:prstGeom>
+          <a:noFill/>
+        </p:spPr>
+        <p:txBody>
+          <a:bodyPr wrap="none" lIns="91440" tIns="45720" rIns="91440" bIns="45720">
+            <a:prstTxWarp prst="textArchUp">
+              <a:avLst/>
+            </a:prstTxWarp>
+            <a:spAutoFit/>
+          </a:bodyPr>
+          <a:lstStyle/>
+          <a:p>
+            <a:pPr algn="ctr"/>
+            <a:r>
+              <a:rPr lang="en-US" sz="5400" dirty="0">
+                <a:ln w="0"/>
+                <a:effectLst>
+                  <a:outerShdw blurRad="38100" dist="19050" dir="2700000" algn="tl" rotWithShape="0">
+                    <a:schemeClr val="dk1">
+                      <a:alpha val="40000"/>
+                    </a:schemeClr>
+                  </a:outerShdw>
+                </a:effectLst>
+                <a:latin typeface="Viner Hand ITC" panose="03070502030502020203" pitchFamily="66" charset="0"/>
+              </a:rPr>
+              <a:t>Realm of Shadows</a:t>
+            </a:r>
+          </a:p>
+        </p:txBody>
+      </p:sp>
+    </p:spTree>
+    <p:extLst>
+      <p:ext uri="{BB962C8B-B14F-4D97-AF65-F5344CB8AC3E}">
+        <p14:creationId xmlns:p14="http://schemas.microsoft.com/office/powerpoint/2010/main" val="4258183559"/>
       </p:ext>
     </p:extLst>
   </p:cSld>

</xml_diff>